<commit_message>
Last Update 21-08-2018  0:44:50.69
</commit_message>
<xml_diff>
--- a/Slides/Unit 3/CS8392-U3-Input-and-Output.pptx
+++ b/Slides/Unit 3/CS8392-U3-Input-and-Output.pptx
@@ -5,7 +5,7 @@
     <p:sldMasterId id="2147483648" r:id="rId1"/>
   </p:sldMasterIdLst>
   <p:notesMasterIdLst>
-    <p:notesMasterId r:id="rId21"/>
+    <p:notesMasterId r:id="rId26"/>
   </p:notesMasterIdLst>
   <p:sldIdLst>
     <p:sldId id="256" r:id="rId2"/>
@@ -26,7 +26,12 @@
     <p:sldId id="287" r:id="rId17"/>
     <p:sldId id="288" r:id="rId18"/>
     <p:sldId id="289" r:id="rId19"/>
-    <p:sldId id="272" r:id="rId20"/>
+    <p:sldId id="290" r:id="rId20"/>
+    <p:sldId id="291" r:id="rId21"/>
+    <p:sldId id="292" r:id="rId22"/>
+    <p:sldId id="293" r:id="rId23"/>
+    <p:sldId id="294" r:id="rId24"/>
+    <p:sldId id="272" r:id="rId25"/>
   </p:sldIdLst>
   <p:sldSz cx="9144000" cy="6858000" type="screen4x3"/>
   <p:notesSz cx="6858000" cy="9144000"/>
@@ -3685,8 +3690,8 @@
     <dgm:cxn modelId="{08968E05-4511-45DB-8159-98EB20DB04B5}" type="presOf" srcId="{634777A9-231D-4A0F-BCDC-446289EF55D9}" destId="{438F5A25-E0BE-4DE2-A543-75B7263FCF76}" srcOrd="0" destOrd="0" presId="urn:microsoft.com/office/officeart/2005/8/layout/orgChart1"/>
     <dgm:cxn modelId="{DEE619D0-29DE-49EC-A4A2-7916B194094B}" type="presOf" srcId="{956B17DC-2C95-4E06-B810-DD5CA493BF78}" destId="{A2B6118C-07AD-4C8B-BE56-16F635147B25}" srcOrd="1" destOrd="0" presId="urn:microsoft.com/office/officeart/2005/8/layout/orgChart1"/>
     <dgm:cxn modelId="{2F6B5000-2DA7-4232-A445-A47C38807AE1}" srcId="{956B17DC-2C95-4E06-B810-DD5CA493BF78}" destId="{BDFF3A12-59D2-498D-B1AA-0F1C76CBC8B1}" srcOrd="2" destOrd="0" parTransId="{215B287E-F3ED-4906-B38C-A0C0FD6BE9AA}" sibTransId="{659EE948-E726-4E2D-AE31-1876C061A18E}"/>
+    <dgm:cxn modelId="{17EF97D3-C879-4274-8EAA-A71F278162CF}" type="presOf" srcId="{03F285E3-3744-4A7E-93F2-26617D693A08}" destId="{AAB3E443-3734-4B68-8876-9560E80A50D7}" srcOrd="0" destOrd="0" presId="urn:microsoft.com/office/officeart/2005/8/layout/orgChart1"/>
     <dgm:cxn modelId="{84A0EE03-9CEE-4C5A-B6FA-9A4DFE232257}" type="presOf" srcId="{BDFF3A12-59D2-498D-B1AA-0F1C76CBC8B1}" destId="{8752747F-92AA-4122-9397-A957BFCCD991}" srcOrd="0" destOrd="0" presId="urn:microsoft.com/office/officeart/2005/8/layout/orgChart1"/>
-    <dgm:cxn modelId="{17EF97D3-C879-4274-8EAA-A71F278162CF}" type="presOf" srcId="{03F285E3-3744-4A7E-93F2-26617D693A08}" destId="{AAB3E443-3734-4B68-8876-9560E80A50D7}" srcOrd="0" destOrd="0" presId="urn:microsoft.com/office/officeart/2005/8/layout/orgChart1"/>
     <dgm:cxn modelId="{D9C8719D-505E-41E6-AC3B-EEECAC1B5165}" type="presOf" srcId="{BDFF3A12-59D2-498D-B1AA-0F1C76CBC8B1}" destId="{D95D0962-AF33-49E1-BA2C-421FA549B41E}" srcOrd="1" destOrd="0" presId="urn:microsoft.com/office/officeart/2005/8/layout/orgChart1"/>
     <dgm:cxn modelId="{0E9EA173-5A77-405A-84B8-ACE9989F0785}" type="presOf" srcId="{19D50460-99F2-467F-A347-D15F32450242}" destId="{383B315B-93D8-4BB6-9292-A7467A6BD999}" srcOrd="0" destOrd="0" presId="urn:microsoft.com/office/officeart/2005/8/layout/orgChart1"/>
     <dgm:cxn modelId="{6C60D999-AF6E-44DE-9195-33EC1193A8F6}" srcId="{956B17DC-2C95-4E06-B810-DD5CA493BF78}" destId="{840BDAEE-643D-4C84-95D7-E30F2FCC0D15}" srcOrd="0" destOrd="0" parTransId="{9CE0A438-97F8-4647-A9FB-2B08D752922B}" sibTransId="{4EC20BBE-C253-4949-9240-C4041901BBB2}"/>
@@ -4497,18 +4502,18 @@
     </dgm:pt>
   </dgm:ptLst>
   <dgm:cxnLst>
-    <dgm:cxn modelId="{6C60D999-AF6E-44DE-9195-33EC1193A8F6}" srcId="{956B17DC-2C95-4E06-B810-DD5CA493BF78}" destId="{840BDAEE-643D-4C84-95D7-E30F2FCC0D15}" srcOrd="0" destOrd="0" parTransId="{9CE0A438-97F8-4647-A9FB-2B08D752922B}" sibTransId="{4EC20BBE-C253-4949-9240-C4041901BBB2}"/>
     <dgm:cxn modelId="{FFB359FE-4EE8-41BF-AB39-6FE16DC4D6EA}" srcId="{956B17DC-2C95-4E06-B810-DD5CA493BF78}" destId="{634777A9-231D-4A0F-BCDC-446289EF55D9}" srcOrd="1" destOrd="0" parTransId="{19D50460-99F2-467F-A347-D15F32450242}" sibTransId="{3DBDDEBB-E8E9-4C5E-AF46-6C67E42517CD}"/>
-    <dgm:cxn modelId="{3F6DF198-5B7C-4233-B33C-4E06672AF97C}" type="presOf" srcId="{840BDAEE-643D-4C84-95D7-E30F2FCC0D15}" destId="{363274B1-C6CF-4D7C-9CAE-BDAE04C1D4B2}" srcOrd="0" destOrd="0" presId="urn:microsoft.com/office/officeart/2005/8/layout/orgChart1"/>
+    <dgm:cxn modelId="{3321FEC6-C316-4753-BCB5-EC87DFC40863}" type="presOf" srcId="{19D50460-99F2-467F-A347-D15F32450242}" destId="{383B315B-93D8-4BB6-9292-A7467A6BD999}" srcOrd="0" destOrd="0" presId="urn:microsoft.com/office/officeart/2005/8/layout/orgChart1"/>
+    <dgm:cxn modelId="{38362E8E-37DA-4201-BA05-0A1112DC6CA2}" type="presOf" srcId="{9CE0A438-97F8-4647-A9FB-2B08D752922B}" destId="{7E2B22AD-24DF-4937-90CE-CD6422006E09}" srcOrd="0" destOrd="0" presId="urn:microsoft.com/office/officeart/2005/8/layout/orgChart1"/>
     <dgm:cxn modelId="{885931B0-28EA-41AF-90B0-238DB613E08C}" srcId="{03F285E3-3744-4A7E-93F2-26617D693A08}" destId="{956B17DC-2C95-4E06-B810-DD5CA493BF78}" srcOrd="0" destOrd="0" parTransId="{7E8B7CE7-8AF2-4DC5-8301-8DA5611DBB38}" sibTransId="{25FF72EE-27B8-4321-ABBF-82DE8946766F}"/>
+    <dgm:cxn modelId="{43811876-4A58-4228-AD2C-6B3C495C6466}" type="presOf" srcId="{03F285E3-3744-4A7E-93F2-26617D693A08}" destId="{AAB3E443-3734-4B68-8876-9560E80A50D7}" srcOrd="0" destOrd="0" presId="urn:microsoft.com/office/officeart/2005/8/layout/orgChart1"/>
     <dgm:cxn modelId="{54A1CFE5-7D9F-4890-AEF2-9F424E932DD3}" type="presOf" srcId="{634777A9-231D-4A0F-BCDC-446289EF55D9}" destId="{438F5A25-E0BE-4DE2-A543-75B7263FCF76}" srcOrd="0" destOrd="0" presId="urn:microsoft.com/office/officeart/2005/8/layout/orgChart1"/>
-    <dgm:cxn modelId="{38362E8E-37DA-4201-BA05-0A1112DC6CA2}" type="presOf" srcId="{9CE0A438-97F8-4647-A9FB-2B08D752922B}" destId="{7E2B22AD-24DF-4937-90CE-CD6422006E09}" srcOrd="0" destOrd="0" presId="urn:microsoft.com/office/officeart/2005/8/layout/orgChart1"/>
-    <dgm:cxn modelId="{3321FEC6-C316-4753-BCB5-EC87DFC40863}" type="presOf" srcId="{19D50460-99F2-467F-A347-D15F32450242}" destId="{383B315B-93D8-4BB6-9292-A7467A6BD999}" srcOrd="0" destOrd="0" presId="urn:microsoft.com/office/officeart/2005/8/layout/orgChart1"/>
+    <dgm:cxn modelId="{38E1C66F-BE8D-4CF8-B33A-019E3FDB36F2}" type="presOf" srcId="{634777A9-231D-4A0F-BCDC-446289EF55D9}" destId="{D786FC2E-BBD2-4002-8CEE-741757BBB792}" srcOrd="1" destOrd="0" presId="urn:microsoft.com/office/officeart/2005/8/layout/orgChart1"/>
+    <dgm:cxn modelId="{13BEBB85-A5F3-4D28-8809-C2EC25A4375F}" type="presOf" srcId="{956B17DC-2C95-4E06-B810-DD5CA493BF78}" destId="{A2B6118C-07AD-4C8B-BE56-16F635147B25}" srcOrd="1" destOrd="0" presId="urn:microsoft.com/office/officeart/2005/8/layout/orgChart1"/>
     <dgm:cxn modelId="{C44B30EA-BA58-45BF-9BB2-F415462A4000}" type="presOf" srcId="{840BDAEE-643D-4C84-95D7-E30F2FCC0D15}" destId="{65CD50E4-D472-4534-A395-294B715CE1C2}" srcOrd="1" destOrd="0" presId="urn:microsoft.com/office/officeart/2005/8/layout/orgChart1"/>
     <dgm:cxn modelId="{9D4E1A7D-5167-4AF6-B6FF-1EE7166FA7CC}" type="presOf" srcId="{956B17DC-2C95-4E06-B810-DD5CA493BF78}" destId="{0EA68955-0B03-4132-B79C-83BF97C1751B}" srcOrd="0" destOrd="0" presId="urn:microsoft.com/office/officeart/2005/8/layout/orgChart1"/>
-    <dgm:cxn modelId="{43811876-4A58-4228-AD2C-6B3C495C6466}" type="presOf" srcId="{03F285E3-3744-4A7E-93F2-26617D693A08}" destId="{AAB3E443-3734-4B68-8876-9560E80A50D7}" srcOrd="0" destOrd="0" presId="urn:microsoft.com/office/officeart/2005/8/layout/orgChart1"/>
-    <dgm:cxn modelId="{13BEBB85-A5F3-4D28-8809-C2EC25A4375F}" type="presOf" srcId="{956B17DC-2C95-4E06-B810-DD5CA493BF78}" destId="{A2B6118C-07AD-4C8B-BE56-16F635147B25}" srcOrd="1" destOrd="0" presId="urn:microsoft.com/office/officeart/2005/8/layout/orgChart1"/>
-    <dgm:cxn modelId="{38E1C66F-BE8D-4CF8-B33A-019E3FDB36F2}" type="presOf" srcId="{634777A9-231D-4A0F-BCDC-446289EF55D9}" destId="{D786FC2E-BBD2-4002-8CEE-741757BBB792}" srcOrd="1" destOrd="0" presId="urn:microsoft.com/office/officeart/2005/8/layout/orgChart1"/>
+    <dgm:cxn modelId="{3F6DF198-5B7C-4233-B33C-4E06672AF97C}" type="presOf" srcId="{840BDAEE-643D-4C84-95D7-E30F2FCC0D15}" destId="{363274B1-C6CF-4D7C-9CAE-BDAE04C1D4B2}" srcOrd="0" destOrd="0" presId="urn:microsoft.com/office/officeart/2005/8/layout/orgChart1"/>
+    <dgm:cxn modelId="{6C60D999-AF6E-44DE-9195-33EC1193A8F6}" srcId="{956B17DC-2C95-4E06-B810-DD5CA493BF78}" destId="{840BDAEE-643D-4C84-95D7-E30F2FCC0D15}" srcOrd="0" destOrd="0" parTransId="{9CE0A438-97F8-4647-A9FB-2B08D752922B}" sibTransId="{4EC20BBE-C253-4949-9240-C4041901BBB2}"/>
     <dgm:cxn modelId="{694DA0D1-E957-451E-897B-BB904EA412D2}" type="presParOf" srcId="{AAB3E443-3734-4B68-8876-9560E80A50D7}" destId="{46732DBD-9621-4E92-B62C-FA6A7AA7F493}" srcOrd="0" destOrd="0" presId="urn:microsoft.com/office/officeart/2005/8/layout/orgChart1"/>
     <dgm:cxn modelId="{44613950-5436-476E-872D-3EE417DE597A}" type="presParOf" srcId="{46732DBD-9621-4E92-B62C-FA6A7AA7F493}" destId="{C01FF65E-2850-4A57-809D-79F719D63148}" srcOrd="0" destOrd="0" presId="urn:microsoft.com/office/officeart/2005/8/layout/orgChart1"/>
     <dgm:cxn modelId="{C12D75A9-EBDD-4D3D-8246-385FF2C05CBD}" type="presParOf" srcId="{C01FF65E-2850-4A57-809D-79F719D63148}" destId="{0EA68955-0B03-4132-B79C-83BF97C1751B}" srcOrd="0" destOrd="0" presId="urn:microsoft.com/office/officeart/2005/8/layout/orgChart1"/>
@@ -4929,8 +4934,8 @@
   <dgm:cxnLst>
     <dgm:cxn modelId="{FFB359FE-4EE8-41BF-AB39-6FE16DC4D6EA}" srcId="{956B17DC-2C95-4E06-B810-DD5CA493BF78}" destId="{634777A9-231D-4A0F-BCDC-446289EF55D9}" srcOrd="1" destOrd="0" parTransId="{19D50460-99F2-467F-A347-D15F32450242}" sibTransId="{3DBDDEBB-E8E9-4C5E-AF46-6C67E42517CD}"/>
     <dgm:cxn modelId="{D43EF937-95A5-443E-8C26-EC26F8A4CB4E}" srcId="{956B17DC-2C95-4E06-B810-DD5CA493BF78}" destId="{DFE8639E-BB2A-4ED9-B2E0-376B54D8F334}" srcOrd="2" destOrd="0" parTransId="{44498A76-07E9-4A12-9A46-28A20D451EC1}" sibTransId="{9BD007D2-B908-447C-83C6-3290F662142E}"/>
+    <dgm:cxn modelId="{5580DF11-FE6E-4673-9BAE-9E9F3C08BB7D}" type="presOf" srcId="{634777A9-231D-4A0F-BCDC-446289EF55D9}" destId="{D786FC2E-BBD2-4002-8CEE-741757BBB792}" srcOrd="1" destOrd="0" presId="urn:microsoft.com/office/officeart/2005/8/layout/orgChart1"/>
     <dgm:cxn modelId="{E097FCCD-E5EA-4E97-8741-F431894D9374}" type="presOf" srcId="{840BDAEE-643D-4C84-95D7-E30F2FCC0D15}" destId="{65CD50E4-D472-4534-A395-294B715CE1C2}" srcOrd="1" destOrd="0" presId="urn:microsoft.com/office/officeart/2005/8/layout/orgChart1"/>
-    <dgm:cxn modelId="{5580DF11-FE6E-4673-9BAE-9E9F3C08BB7D}" type="presOf" srcId="{634777A9-231D-4A0F-BCDC-446289EF55D9}" destId="{D786FC2E-BBD2-4002-8CEE-741757BBB792}" srcOrd="1" destOrd="0" presId="urn:microsoft.com/office/officeart/2005/8/layout/orgChart1"/>
     <dgm:cxn modelId="{1A1CCDC8-1335-4910-9EB4-9D9066AC26EE}" type="presOf" srcId="{44498A76-07E9-4A12-9A46-28A20D451EC1}" destId="{B433DA77-3E96-4679-8B50-0F6E347FF21B}" srcOrd="0" destOrd="0" presId="urn:microsoft.com/office/officeart/2005/8/layout/orgChart1"/>
     <dgm:cxn modelId="{885931B0-28EA-41AF-90B0-238DB613E08C}" srcId="{03F285E3-3744-4A7E-93F2-26617D693A08}" destId="{956B17DC-2C95-4E06-B810-DD5CA493BF78}" srcOrd="0" destOrd="0" parTransId="{7E8B7CE7-8AF2-4DC5-8301-8DA5611DBB38}" sibTransId="{25FF72EE-27B8-4321-ABBF-82DE8946766F}"/>
     <dgm:cxn modelId="{4AE451F0-FF3C-4A8D-B244-F84530C6FF25}" type="presOf" srcId="{956B17DC-2C95-4E06-B810-DD5CA493BF78}" destId="{A2B6118C-07AD-4C8B-BE56-16F635147B25}" srcOrd="1" destOrd="0" presId="urn:microsoft.com/office/officeart/2005/8/layout/orgChart1"/>
@@ -17528,39 +17533,19 @@
           <a:p>
             <a:r>
               <a:rPr lang="en-US" dirty="0" smtClean="0"/>
-              <a:t>In Java, characters are stored using Unicode </a:t>
-            </a:r>
-            <a:r>
-              <a:rPr lang="en-US" dirty="0" smtClean="0"/>
-              <a:t>conventions</a:t>
+              <a:t>In Java, characters are stored using Unicode conventions</a:t>
             </a:r>
           </a:p>
           <a:p>
             <a:r>
               <a:rPr lang="en-US" dirty="0" smtClean="0"/>
-              <a:t>Character </a:t>
-            </a:r>
-            <a:r>
-              <a:rPr lang="en-US" dirty="0" smtClean="0"/>
-              <a:t>stream automatically allows us to read/write data character by character</a:t>
-            </a:r>
-            <a:r>
-              <a:rPr lang="en-US" dirty="0" smtClean="0"/>
-              <a:t>.</a:t>
+              <a:t>Character stream automatically allows us to read/write data character by character.</a:t>
             </a:r>
           </a:p>
           <a:p>
             <a:r>
               <a:rPr lang="en-IN" dirty="0" smtClean="0"/>
-              <a:t>Suitable to </a:t>
-            </a:r>
-            <a:r>
-              <a:rPr lang="en-IN" dirty="0" smtClean="0"/>
-              <a:t>perform </a:t>
-            </a:r>
-            <a:r>
-              <a:rPr lang="en-IN" dirty="0" smtClean="0"/>
-              <a:t>reading and writing in text files.</a:t>
+              <a:t>Suitable to perform reading and writing in text files.</a:t>
             </a:r>
           </a:p>
           <a:p>
@@ -17688,37 +17673,13 @@
           <a:p>
             <a:r>
               <a:rPr lang="en-US" dirty="0" smtClean="0"/>
-              <a:t>Byte streams process data byte by byte (8 bits</a:t>
-            </a:r>
-            <a:r>
-              <a:rPr lang="en-US" dirty="0" smtClean="0"/>
-              <a:t>)</a:t>
+              <a:t>Byte streams process data byte by byte (8 bits)</a:t>
             </a:r>
           </a:p>
           <a:p>
             <a:r>
               <a:rPr lang="en-IN" dirty="0" smtClean="0"/>
-              <a:t>Suitable </a:t>
-            </a:r>
-            <a:r>
-              <a:rPr lang="en-IN" dirty="0" smtClean="0"/>
-              <a:t>to </a:t>
-            </a:r>
-            <a:r>
-              <a:rPr lang="en-IN" dirty="0" smtClean="0"/>
-              <a:t>perform reading </a:t>
-            </a:r>
-            <a:r>
-              <a:rPr lang="en-IN" dirty="0" smtClean="0"/>
-              <a:t>and writing in </a:t>
-            </a:r>
-            <a:r>
-              <a:rPr lang="en-IN" dirty="0" smtClean="0"/>
-              <a:t>binary files</a:t>
-            </a:r>
-            <a:r>
-              <a:rPr lang="en-IN" dirty="0" smtClean="0"/>
-              <a:t>.</a:t>
+              <a:t>Suitable to perform reading and writing in binary files.</a:t>
             </a:r>
           </a:p>
           <a:p>
@@ -18189,6 +18150,788 @@
             <p:ph type="title"/>
           </p:nvPr>
         </p:nvSpPr>
+        <p:spPr/>
+        <p:txBody>
+          <a:bodyPr/>
+          <a:lstStyle/>
+          <a:p>
+            <a:r>
+              <a:rPr lang="en-IN" dirty="0" smtClean="0"/>
+              <a:t>Writing data to console</a:t>
+            </a:r>
+            <a:endParaRPr lang="en-US" dirty="0"/>
+          </a:p>
+        </p:txBody>
+      </p:sp>
+      <p:pic>
+        <p:nvPicPr>
+          <p:cNvPr id="1026" name="Picture 2"/>
+          <p:cNvPicPr>
+            <a:picLocks noChangeAspect="1" noChangeArrowheads="1"/>
+          </p:cNvPicPr>
+          <p:nvPr/>
+        </p:nvPicPr>
+        <p:blipFill>
+          <a:blip r:embed="rId2"/>
+          <a:srcRect/>
+          <a:stretch>
+            <a:fillRect/>
+          </a:stretch>
+        </p:blipFill>
+        <p:spPr bwMode="auto">
+          <a:xfrm>
+            <a:off x="609600" y="1752600"/>
+            <a:ext cx="5486400" cy="3858178"/>
+          </a:xfrm>
+          <a:prstGeom prst="rect">
+            <a:avLst/>
+          </a:prstGeom>
+          <a:noFill/>
+          <a:ln w="9525">
+            <a:noFill/>
+            <a:miter lim="800000"/>
+            <a:headEnd/>
+            <a:tailEnd/>
+          </a:ln>
+          <a:effectLst/>
+        </p:spPr>
+      </p:pic>
+      <p:pic>
+        <p:nvPicPr>
+          <p:cNvPr id="1027" name="Picture 3"/>
+          <p:cNvPicPr>
+            <a:picLocks noChangeAspect="1" noChangeArrowheads="1"/>
+          </p:cNvPicPr>
+          <p:nvPr/>
+        </p:nvPicPr>
+        <p:blipFill>
+          <a:blip r:embed="rId3"/>
+          <a:srcRect/>
+          <a:stretch>
+            <a:fillRect/>
+          </a:stretch>
+        </p:blipFill>
+        <p:spPr bwMode="auto">
+          <a:xfrm>
+            <a:off x="3429000" y="4648200"/>
+            <a:ext cx="5114925" cy="1933575"/>
+          </a:xfrm>
+          <a:prstGeom prst="rect">
+            <a:avLst/>
+          </a:prstGeom>
+          <a:noFill/>
+          <a:ln w="9525">
+            <a:noFill/>
+            <a:miter lim="800000"/>
+            <a:headEnd/>
+            <a:tailEnd/>
+          </a:ln>
+          <a:effectLst/>
+        </p:spPr>
+      </p:pic>
+    </p:spTree>
+  </p:cSld>
+  <p:clrMapOvr>
+    <a:masterClrMapping/>
+  </p:clrMapOvr>
+</p:sld>
+</file>
+
+<file path=ppt/slides/slide2.xml><?xml version="1.0" encoding="utf-8"?>
+<p:sld xmlns:a="http://schemas.openxmlformats.org/drawingml/2006/main" xmlns:r="http://schemas.openxmlformats.org/officeDocument/2006/relationships" xmlns:p="http://schemas.openxmlformats.org/presentationml/2006/main">
+  <p:cSld>
+    <p:spTree>
+      <p:nvGrpSpPr>
+        <p:cNvPr id="1" name=""/>
+        <p:cNvGrpSpPr/>
+        <p:nvPr/>
+      </p:nvGrpSpPr>
+      <p:grpSpPr>
+        <a:xfrm>
+          <a:off x="0" y="0"/>
+          <a:ext cx="0" cy="0"/>
+          <a:chOff x="0" y="0"/>
+          <a:chExt cx="0" cy="0"/>
+        </a:xfrm>
+      </p:grpSpPr>
+      <p:sp>
+        <p:nvSpPr>
+          <p:cNvPr id="2" name="Title 1"/>
+          <p:cNvSpPr>
+            <a:spLocks noGrp="1"/>
+          </p:cNvSpPr>
+          <p:nvPr>
+            <p:ph type="title"/>
+          </p:nvPr>
+        </p:nvSpPr>
+        <p:spPr/>
+        <p:txBody>
+          <a:bodyPr/>
+          <a:lstStyle/>
+          <a:p>
+            <a:r>
+              <a:rPr lang="en-IN" dirty="0" smtClean="0"/>
+              <a:t>Input and Output</a:t>
+            </a:r>
+            <a:endParaRPr lang="en-US" dirty="0"/>
+          </a:p>
+        </p:txBody>
+      </p:sp>
+      <p:sp>
+        <p:nvSpPr>
+          <p:cNvPr id="3" name="Content Placeholder 2"/>
+          <p:cNvSpPr>
+            <a:spLocks noGrp="1"/>
+          </p:cNvSpPr>
+          <p:nvPr>
+            <p:ph idx="1"/>
+          </p:nvPr>
+        </p:nvSpPr>
+        <p:spPr/>
+        <p:txBody>
+          <a:bodyPr>
+            <a:normAutofit lnSpcReduction="10000"/>
+          </a:bodyPr>
+          <a:lstStyle/>
+          <a:p>
+            <a:r>
+              <a:rPr lang="en-IN" dirty="0" smtClean="0"/>
+              <a:t>Java supports I/O operations for the verity of source and destinations.</a:t>
+            </a:r>
+          </a:p>
+          <a:p>
+            <a:r>
+              <a:rPr lang="en-IN" dirty="0" smtClean="0"/>
+              <a:t>It contain java.io package that has all classes for </a:t>
+            </a:r>
+            <a:r>
+              <a:rPr lang="en-IN" dirty="0" err="1" smtClean="0"/>
+              <a:t>io</a:t>
+            </a:r>
+            <a:r>
+              <a:rPr lang="en-IN" dirty="0" smtClean="0"/>
+              <a:t> operations.</a:t>
+            </a:r>
+          </a:p>
+          <a:p>
+            <a:r>
+              <a:rPr lang="en-IN" dirty="0" smtClean="0"/>
+              <a:t>It handles the streams</a:t>
+            </a:r>
+          </a:p>
+          <a:p>
+            <a:pPr lvl="1"/>
+            <a:r>
+              <a:rPr lang="en-IN" dirty="0" smtClean="0"/>
+              <a:t>Stream is a sequence of data.</a:t>
+            </a:r>
+          </a:p>
+          <a:p>
+            <a:pPr lvl="1"/>
+            <a:r>
+              <a:rPr lang="en-IN" dirty="0" smtClean="0"/>
+              <a:t>It can be obtained from a specific source.</a:t>
+            </a:r>
+          </a:p>
+          <a:p>
+            <a:pPr lvl="1"/>
+            <a:r>
+              <a:rPr lang="en-IN" dirty="0" smtClean="0"/>
+              <a:t>It is processed by the program to obtain desired results.</a:t>
+            </a:r>
+          </a:p>
+          <a:p>
+            <a:endParaRPr lang="en-IN" dirty="0" smtClean="0"/>
+          </a:p>
+        </p:txBody>
+      </p:sp>
+    </p:spTree>
+  </p:cSld>
+  <p:clrMapOvr>
+    <a:masterClrMapping/>
+  </p:clrMapOvr>
+</p:sld>
+</file>
+
+<file path=ppt/slides/slide20.xml><?xml version="1.0" encoding="utf-8"?>
+<p:sld xmlns:a="http://schemas.openxmlformats.org/drawingml/2006/main" xmlns:r="http://schemas.openxmlformats.org/officeDocument/2006/relationships" xmlns:p="http://schemas.openxmlformats.org/presentationml/2006/main">
+  <p:cSld>
+    <p:spTree>
+      <p:nvGrpSpPr>
+        <p:cNvPr id="1" name=""/>
+        <p:cNvGrpSpPr/>
+        <p:nvPr/>
+      </p:nvGrpSpPr>
+      <p:grpSpPr>
+        <a:xfrm>
+          <a:off x="0" y="0"/>
+          <a:ext cx="0" cy="0"/>
+          <a:chOff x="0" y="0"/>
+          <a:chExt cx="0" cy="0"/>
+        </a:xfrm>
+      </p:grpSpPr>
+      <p:sp>
+        <p:nvSpPr>
+          <p:cNvPr id="2" name="Title 1"/>
+          <p:cNvSpPr>
+            <a:spLocks noGrp="1"/>
+          </p:cNvSpPr>
+          <p:nvPr>
+            <p:ph type="title"/>
+          </p:nvPr>
+        </p:nvSpPr>
+        <p:spPr/>
+        <p:txBody>
+          <a:bodyPr/>
+          <a:lstStyle/>
+          <a:p>
+            <a:r>
+              <a:rPr lang="en-IN" dirty="0" smtClean="0"/>
+              <a:t>Reading Passwords</a:t>
+            </a:r>
+            <a:endParaRPr lang="en-US" dirty="0"/>
+          </a:p>
+        </p:txBody>
+      </p:sp>
+      <p:pic>
+        <p:nvPicPr>
+          <p:cNvPr id="2050" name="Picture 2"/>
+          <p:cNvPicPr>
+            <a:picLocks noChangeAspect="1" noChangeArrowheads="1"/>
+          </p:cNvPicPr>
+          <p:nvPr/>
+        </p:nvPicPr>
+        <p:blipFill>
+          <a:blip r:embed="rId2"/>
+          <a:srcRect/>
+          <a:stretch>
+            <a:fillRect/>
+          </a:stretch>
+        </p:blipFill>
+        <p:spPr bwMode="auto">
+          <a:xfrm>
+            <a:off x="457200" y="1752600"/>
+            <a:ext cx="7248525" cy="4572000"/>
+          </a:xfrm>
+          <a:prstGeom prst="rect">
+            <a:avLst/>
+          </a:prstGeom>
+          <a:noFill/>
+          <a:ln w="9525">
+            <a:noFill/>
+            <a:miter lim="800000"/>
+            <a:headEnd/>
+            <a:tailEnd/>
+          </a:ln>
+          <a:effectLst/>
+        </p:spPr>
+      </p:pic>
+    </p:spTree>
+  </p:cSld>
+  <p:clrMapOvr>
+    <a:masterClrMapping/>
+  </p:clrMapOvr>
+</p:sld>
+</file>
+
+<file path=ppt/slides/slide21.xml><?xml version="1.0" encoding="utf-8"?>
+<p:sld xmlns:a="http://schemas.openxmlformats.org/drawingml/2006/main" xmlns:r="http://schemas.openxmlformats.org/officeDocument/2006/relationships" xmlns:p="http://schemas.openxmlformats.org/presentationml/2006/main">
+  <p:cSld>
+    <p:spTree>
+      <p:nvGrpSpPr>
+        <p:cNvPr id="1" name=""/>
+        <p:cNvGrpSpPr/>
+        <p:nvPr/>
+      </p:nvGrpSpPr>
+      <p:grpSpPr>
+        <a:xfrm>
+          <a:off x="0" y="0"/>
+          <a:ext cx="0" cy="0"/>
+          <a:chOff x="0" y="0"/>
+          <a:chExt cx="0" cy="0"/>
+        </a:xfrm>
+      </p:grpSpPr>
+      <p:sp>
+        <p:nvSpPr>
+          <p:cNvPr id="2" name="Title 1"/>
+          <p:cNvSpPr>
+            <a:spLocks noGrp="1"/>
+          </p:cNvSpPr>
+          <p:nvPr>
+            <p:ph type="title"/>
+          </p:nvPr>
+        </p:nvSpPr>
+        <p:spPr/>
+        <p:txBody>
+          <a:bodyPr/>
+          <a:lstStyle/>
+          <a:p>
+            <a:r>
+              <a:rPr lang="en-IN" dirty="0" smtClean="0"/>
+              <a:t>Output</a:t>
+            </a:r>
+            <a:endParaRPr lang="en-US" dirty="0"/>
+          </a:p>
+        </p:txBody>
+      </p:sp>
+      <p:pic>
+        <p:nvPicPr>
+          <p:cNvPr id="3074" name="Picture 2"/>
+          <p:cNvPicPr>
+            <a:picLocks noChangeAspect="1" noChangeArrowheads="1"/>
+          </p:cNvPicPr>
+          <p:nvPr/>
+        </p:nvPicPr>
+        <p:blipFill>
+          <a:blip r:embed="rId2"/>
+          <a:srcRect/>
+          <a:stretch>
+            <a:fillRect/>
+          </a:stretch>
+        </p:blipFill>
+        <p:spPr bwMode="auto">
+          <a:xfrm>
+            <a:off x="457200" y="1752600"/>
+            <a:ext cx="8223447" cy="1905000"/>
+          </a:xfrm>
+          <a:prstGeom prst="rect">
+            <a:avLst/>
+          </a:prstGeom>
+          <a:noFill/>
+          <a:ln w="9525">
+            <a:noFill/>
+            <a:miter lim="800000"/>
+            <a:headEnd/>
+            <a:tailEnd/>
+          </a:ln>
+          <a:effectLst/>
+        </p:spPr>
+      </p:pic>
+    </p:spTree>
+  </p:cSld>
+  <p:clrMapOvr>
+    <a:masterClrMapping/>
+  </p:clrMapOvr>
+</p:sld>
+</file>
+
+<file path=ppt/slides/slide22.xml><?xml version="1.0" encoding="utf-8"?>
+<p:sld xmlns:a="http://schemas.openxmlformats.org/drawingml/2006/main" xmlns:r="http://schemas.openxmlformats.org/officeDocument/2006/relationships" xmlns:p="http://schemas.openxmlformats.org/presentationml/2006/main">
+  <p:cSld>
+    <p:spTree>
+      <p:nvGrpSpPr>
+        <p:cNvPr id="1" name=""/>
+        <p:cNvGrpSpPr/>
+        <p:nvPr/>
+      </p:nvGrpSpPr>
+      <p:grpSpPr>
+        <a:xfrm>
+          <a:off x="0" y="0"/>
+          <a:ext cx="0" cy="0"/>
+          <a:chOff x="0" y="0"/>
+          <a:chExt cx="0" cy="0"/>
+        </a:xfrm>
+      </p:grpSpPr>
+      <p:sp>
+        <p:nvSpPr>
+          <p:cNvPr id="2" name="Title 1"/>
+          <p:cNvSpPr>
+            <a:spLocks noGrp="1"/>
+          </p:cNvSpPr>
+          <p:nvPr>
+            <p:ph type="title"/>
+          </p:nvPr>
+        </p:nvSpPr>
+        <p:spPr>
+          <a:xfrm>
+            <a:off x="457200" y="274638"/>
+            <a:ext cx="4724400" cy="563562"/>
+          </a:xfrm>
+        </p:spPr>
+        <p:txBody>
+          <a:bodyPr>
+            <a:normAutofit/>
+          </a:bodyPr>
+          <a:lstStyle/>
+          <a:p>
+            <a:r>
+              <a:rPr lang="en-IN" sz="2500" dirty="0" smtClean="0"/>
+              <a:t>Reading data from </a:t>
+            </a:r>
+            <a:r>
+              <a:rPr lang="en-IN" sz="2500" dirty="0" smtClean="0"/>
+              <a:t>f</a:t>
+            </a:r>
+            <a:r>
+              <a:rPr lang="en-IN" sz="2500" dirty="0" smtClean="0"/>
+              <a:t>ile</a:t>
+            </a:r>
+            <a:endParaRPr lang="en-US" sz="2500" dirty="0"/>
+          </a:p>
+        </p:txBody>
+      </p:sp>
+      <p:pic>
+        <p:nvPicPr>
+          <p:cNvPr id="4104" name="Picture 8"/>
+          <p:cNvPicPr>
+            <a:picLocks noChangeAspect="1" noChangeArrowheads="1"/>
+          </p:cNvPicPr>
+          <p:nvPr/>
+        </p:nvPicPr>
+        <p:blipFill>
+          <a:blip r:embed="rId2"/>
+          <a:srcRect/>
+          <a:stretch>
+            <a:fillRect/>
+          </a:stretch>
+        </p:blipFill>
+        <p:spPr bwMode="auto">
+          <a:xfrm>
+            <a:off x="219074" y="937652"/>
+            <a:ext cx="6181726" cy="5615548"/>
+          </a:xfrm>
+          <a:prstGeom prst="rect">
+            <a:avLst/>
+          </a:prstGeom>
+          <a:noFill/>
+          <a:ln w="9525">
+            <a:noFill/>
+            <a:miter lim="800000"/>
+            <a:headEnd/>
+            <a:tailEnd/>
+          </a:ln>
+          <a:effectLst/>
+        </p:spPr>
+      </p:pic>
+      <p:pic>
+        <p:nvPicPr>
+          <p:cNvPr id="4100" name="Picture 4"/>
+          <p:cNvPicPr>
+            <a:picLocks noChangeAspect="1" noChangeArrowheads="1"/>
+          </p:cNvPicPr>
+          <p:nvPr/>
+        </p:nvPicPr>
+        <p:blipFill>
+          <a:blip r:embed="rId3"/>
+          <a:srcRect/>
+          <a:stretch>
+            <a:fillRect/>
+          </a:stretch>
+        </p:blipFill>
+        <p:spPr bwMode="auto">
+          <a:xfrm>
+            <a:off x="5715000" y="1609725"/>
+            <a:ext cx="2343150" cy="1162050"/>
+          </a:xfrm>
+          <a:prstGeom prst="rect">
+            <a:avLst/>
+          </a:prstGeom>
+          <a:noFill/>
+          <a:ln w="9525">
+            <a:noFill/>
+            <a:miter lim="800000"/>
+            <a:headEnd/>
+            <a:tailEnd/>
+          </a:ln>
+          <a:effectLst/>
+        </p:spPr>
+      </p:pic>
+      <p:pic>
+        <p:nvPicPr>
+          <p:cNvPr id="4099" name="Picture 3"/>
+          <p:cNvPicPr>
+            <a:picLocks noChangeAspect="1" noChangeArrowheads="1"/>
+          </p:cNvPicPr>
+          <p:nvPr/>
+        </p:nvPicPr>
+        <p:blipFill>
+          <a:blip r:embed="rId4"/>
+          <a:srcRect/>
+          <a:stretch>
+            <a:fillRect/>
+          </a:stretch>
+        </p:blipFill>
+        <p:spPr bwMode="auto">
+          <a:xfrm>
+            <a:off x="5715000" y="3209925"/>
+            <a:ext cx="2971800" cy="1743075"/>
+          </a:xfrm>
+          <a:prstGeom prst="rect">
+            <a:avLst/>
+          </a:prstGeom>
+          <a:noFill/>
+          <a:ln w="9525">
+            <a:noFill/>
+            <a:miter lim="800000"/>
+            <a:headEnd/>
+            <a:tailEnd/>
+          </a:ln>
+          <a:effectLst/>
+        </p:spPr>
+      </p:pic>
+    </p:spTree>
+  </p:cSld>
+  <p:clrMapOvr>
+    <a:masterClrMapping/>
+  </p:clrMapOvr>
+</p:sld>
+</file>
+
+<file path=ppt/slides/slide23.xml><?xml version="1.0" encoding="utf-8"?>
+<p:sld xmlns:a="http://schemas.openxmlformats.org/drawingml/2006/main" xmlns:r="http://schemas.openxmlformats.org/officeDocument/2006/relationships" xmlns:p="http://schemas.openxmlformats.org/presentationml/2006/main">
+  <p:cSld>
+    <p:spTree>
+      <p:nvGrpSpPr>
+        <p:cNvPr id="1" name=""/>
+        <p:cNvGrpSpPr/>
+        <p:nvPr/>
+      </p:nvGrpSpPr>
+      <p:grpSpPr>
+        <a:xfrm>
+          <a:off x="0" y="0"/>
+          <a:ext cx="0" cy="0"/>
+          <a:chOff x="0" y="0"/>
+          <a:chExt cx="0" cy="0"/>
+        </a:xfrm>
+      </p:grpSpPr>
+      <p:sp>
+        <p:nvSpPr>
+          <p:cNvPr id="2" name="Title 1"/>
+          <p:cNvSpPr>
+            <a:spLocks noGrp="1"/>
+          </p:cNvSpPr>
+          <p:nvPr>
+            <p:ph type="title"/>
+          </p:nvPr>
+        </p:nvSpPr>
+        <p:spPr>
+          <a:xfrm>
+            <a:off x="457200" y="274638"/>
+            <a:ext cx="3124200" cy="563562"/>
+          </a:xfrm>
+        </p:spPr>
+        <p:txBody>
+          <a:bodyPr>
+            <a:normAutofit/>
+          </a:bodyPr>
+          <a:lstStyle/>
+          <a:p>
+            <a:r>
+              <a:rPr lang="en-IN" sz="2500" dirty="0" smtClean="0"/>
+              <a:t>Writing data to </a:t>
+            </a:r>
+            <a:r>
+              <a:rPr lang="en-IN" sz="2500" dirty="0" smtClean="0"/>
+              <a:t>f</a:t>
+            </a:r>
+            <a:r>
+              <a:rPr lang="en-IN" sz="2500" dirty="0" smtClean="0"/>
+              <a:t>ile</a:t>
+            </a:r>
+            <a:endParaRPr lang="en-US" sz="2500" dirty="0"/>
+          </a:p>
+        </p:txBody>
+      </p:sp>
+      <p:pic>
+        <p:nvPicPr>
+          <p:cNvPr id="4098" name="Picture 2"/>
+          <p:cNvPicPr>
+            <a:picLocks noChangeAspect="1" noChangeArrowheads="1"/>
+          </p:cNvPicPr>
+          <p:nvPr/>
+        </p:nvPicPr>
+        <p:blipFill>
+          <a:blip r:embed="rId2"/>
+          <a:srcRect/>
+          <a:stretch>
+            <a:fillRect/>
+          </a:stretch>
+        </p:blipFill>
+        <p:spPr bwMode="auto">
+          <a:xfrm>
+            <a:off x="457200" y="1142999"/>
+            <a:ext cx="5181600" cy="5514361"/>
+          </a:xfrm>
+          <a:prstGeom prst="rect">
+            <a:avLst/>
+          </a:prstGeom>
+          <a:noFill/>
+          <a:ln w="9525">
+            <a:noFill/>
+            <a:miter lim="800000"/>
+            <a:headEnd/>
+            <a:tailEnd/>
+          </a:ln>
+          <a:effectLst/>
+        </p:spPr>
+      </p:pic>
+      <p:pic>
+        <p:nvPicPr>
+          <p:cNvPr id="4099" name="Picture 3"/>
+          <p:cNvPicPr>
+            <a:picLocks noChangeAspect="1" noChangeArrowheads="1"/>
+          </p:cNvPicPr>
+          <p:nvPr/>
+        </p:nvPicPr>
+        <p:blipFill>
+          <a:blip r:embed="rId3"/>
+          <a:srcRect/>
+          <a:stretch>
+            <a:fillRect/>
+          </a:stretch>
+        </p:blipFill>
+        <p:spPr bwMode="auto">
+          <a:xfrm>
+            <a:off x="5486400" y="3124200"/>
+            <a:ext cx="2971800" cy="1743075"/>
+          </a:xfrm>
+          <a:prstGeom prst="rect">
+            <a:avLst/>
+          </a:prstGeom>
+          <a:noFill/>
+          <a:ln w="9525">
+            <a:noFill/>
+            <a:miter lim="800000"/>
+            <a:headEnd/>
+            <a:tailEnd/>
+          </a:ln>
+          <a:effectLst/>
+        </p:spPr>
+      </p:pic>
+      <p:pic>
+        <p:nvPicPr>
+          <p:cNvPr id="4100" name="Picture 4"/>
+          <p:cNvPicPr>
+            <a:picLocks noChangeAspect="1" noChangeArrowheads="1"/>
+          </p:cNvPicPr>
+          <p:nvPr/>
+        </p:nvPicPr>
+        <p:blipFill>
+          <a:blip r:embed="rId4"/>
+          <a:srcRect/>
+          <a:stretch>
+            <a:fillRect/>
+          </a:stretch>
+        </p:blipFill>
+        <p:spPr bwMode="auto">
+          <a:xfrm>
+            <a:off x="5486400" y="228600"/>
+            <a:ext cx="2343150" cy="1162050"/>
+          </a:xfrm>
+          <a:prstGeom prst="rect">
+            <a:avLst/>
+          </a:prstGeom>
+          <a:noFill/>
+          <a:ln w="9525">
+            <a:noFill/>
+            <a:miter lim="800000"/>
+            <a:headEnd/>
+            <a:tailEnd/>
+          </a:ln>
+          <a:effectLst/>
+        </p:spPr>
+      </p:pic>
+      <p:pic>
+        <p:nvPicPr>
+          <p:cNvPr id="4101" name="Picture 5"/>
+          <p:cNvPicPr>
+            <a:picLocks noChangeAspect="1" noChangeArrowheads="1"/>
+          </p:cNvPicPr>
+          <p:nvPr/>
+        </p:nvPicPr>
+        <p:blipFill>
+          <a:blip r:embed="rId5"/>
+          <a:srcRect/>
+          <a:stretch>
+            <a:fillRect/>
+          </a:stretch>
+        </p:blipFill>
+        <p:spPr bwMode="auto">
+          <a:xfrm>
+            <a:off x="5486400" y="5029200"/>
+            <a:ext cx="3162300" cy="1238250"/>
+          </a:xfrm>
+          <a:prstGeom prst="rect">
+            <a:avLst/>
+          </a:prstGeom>
+          <a:noFill/>
+          <a:ln w="9525">
+            <a:noFill/>
+            <a:miter lim="800000"/>
+            <a:headEnd/>
+            <a:tailEnd/>
+          </a:ln>
+          <a:effectLst/>
+        </p:spPr>
+      </p:pic>
+      <p:pic>
+        <p:nvPicPr>
+          <p:cNvPr id="4102" name="Picture 6"/>
+          <p:cNvPicPr>
+            <a:picLocks noChangeAspect="1" noChangeArrowheads="1"/>
+          </p:cNvPicPr>
+          <p:nvPr/>
+        </p:nvPicPr>
+        <p:blipFill>
+          <a:blip r:embed="rId6"/>
+          <a:srcRect/>
+          <a:stretch>
+            <a:fillRect/>
+          </a:stretch>
+        </p:blipFill>
+        <p:spPr bwMode="auto">
+          <a:xfrm>
+            <a:off x="5486400" y="1524000"/>
+            <a:ext cx="3648075" cy="1333500"/>
+          </a:xfrm>
+          <a:prstGeom prst="rect">
+            <a:avLst/>
+          </a:prstGeom>
+          <a:noFill/>
+          <a:ln w="9525">
+            <a:noFill/>
+            <a:miter lim="800000"/>
+            <a:headEnd/>
+            <a:tailEnd/>
+          </a:ln>
+          <a:effectLst/>
+        </p:spPr>
+      </p:pic>
+    </p:spTree>
+  </p:cSld>
+  <p:clrMapOvr>
+    <a:masterClrMapping/>
+  </p:clrMapOvr>
+</p:sld>
+</file>
+
+<file path=ppt/slides/slide24.xml><?xml version="1.0" encoding="utf-8"?>
+<p:sld xmlns:a="http://schemas.openxmlformats.org/drawingml/2006/main" xmlns:r="http://schemas.openxmlformats.org/officeDocument/2006/relationships" xmlns:p="http://schemas.openxmlformats.org/presentationml/2006/main">
+  <p:cSld>
+    <p:spTree>
+      <p:nvGrpSpPr>
+        <p:cNvPr id="1" name=""/>
+        <p:cNvGrpSpPr/>
+        <p:nvPr/>
+      </p:nvGrpSpPr>
+      <p:grpSpPr>
+        <a:xfrm>
+          <a:off x="0" y="0"/>
+          <a:ext cx="0" cy="0"/>
+          <a:chOff x="0" y="0"/>
+          <a:chExt cx="0" cy="0"/>
+        </a:xfrm>
+      </p:grpSpPr>
+      <p:sp>
+        <p:nvSpPr>
+          <p:cNvPr id="2" name="Title 1"/>
+          <p:cNvSpPr>
+            <a:spLocks noGrp="1"/>
+          </p:cNvSpPr>
+          <p:nvPr>
+            <p:ph type="title"/>
+          </p:nvPr>
+        </p:nvSpPr>
         <p:spPr>
           <a:xfrm>
             <a:off x="457200" y="1981200"/>
@@ -18538,123 +19281,6 @@
 </p:sld>
 </file>
 
-<file path=ppt/slides/slide2.xml><?xml version="1.0" encoding="utf-8"?>
-<p:sld xmlns:a="http://schemas.openxmlformats.org/drawingml/2006/main" xmlns:r="http://schemas.openxmlformats.org/officeDocument/2006/relationships" xmlns:p="http://schemas.openxmlformats.org/presentationml/2006/main">
-  <p:cSld>
-    <p:spTree>
-      <p:nvGrpSpPr>
-        <p:cNvPr id="1" name=""/>
-        <p:cNvGrpSpPr/>
-        <p:nvPr/>
-      </p:nvGrpSpPr>
-      <p:grpSpPr>
-        <a:xfrm>
-          <a:off x="0" y="0"/>
-          <a:ext cx="0" cy="0"/>
-          <a:chOff x="0" y="0"/>
-          <a:chExt cx="0" cy="0"/>
-        </a:xfrm>
-      </p:grpSpPr>
-      <p:sp>
-        <p:nvSpPr>
-          <p:cNvPr id="2" name="Title 1"/>
-          <p:cNvSpPr>
-            <a:spLocks noGrp="1"/>
-          </p:cNvSpPr>
-          <p:nvPr>
-            <p:ph type="title"/>
-          </p:nvPr>
-        </p:nvSpPr>
-        <p:spPr/>
-        <p:txBody>
-          <a:bodyPr/>
-          <a:lstStyle/>
-          <a:p>
-            <a:r>
-              <a:rPr lang="en-IN" dirty="0" smtClean="0"/>
-              <a:t>Input and Output</a:t>
-            </a:r>
-            <a:endParaRPr lang="en-US" dirty="0"/>
-          </a:p>
-        </p:txBody>
-      </p:sp>
-      <p:sp>
-        <p:nvSpPr>
-          <p:cNvPr id="3" name="Content Placeholder 2"/>
-          <p:cNvSpPr>
-            <a:spLocks noGrp="1"/>
-          </p:cNvSpPr>
-          <p:nvPr>
-            <p:ph idx="1"/>
-          </p:nvPr>
-        </p:nvSpPr>
-        <p:spPr/>
-        <p:txBody>
-          <a:bodyPr>
-            <a:normAutofit lnSpcReduction="10000"/>
-          </a:bodyPr>
-          <a:lstStyle/>
-          <a:p>
-            <a:r>
-              <a:rPr lang="en-IN" dirty="0" smtClean="0"/>
-              <a:t>Java supports I/O operations for the verity of source and destinations.</a:t>
-            </a:r>
-          </a:p>
-          <a:p>
-            <a:r>
-              <a:rPr lang="en-IN" dirty="0" smtClean="0"/>
-              <a:t>It contain java.io package that has all classes for </a:t>
-            </a:r>
-            <a:r>
-              <a:rPr lang="en-IN" dirty="0" err="1" smtClean="0"/>
-              <a:t>io</a:t>
-            </a:r>
-            <a:r>
-              <a:rPr lang="en-IN" dirty="0" smtClean="0"/>
-              <a:t> operations.</a:t>
-            </a:r>
-          </a:p>
-          <a:p>
-            <a:r>
-              <a:rPr lang="en-IN" dirty="0" smtClean="0"/>
-              <a:t>It handles the streams</a:t>
-            </a:r>
-          </a:p>
-          <a:p>
-            <a:pPr lvl="1"/>
-            <a:r>
-              <a:rPr lang="en-IN" dirty="0" smtClean="0"/>
-              <a:t>Stream is a sequence of data.</a:t>
-            </a:r>
-          </a:p>
-          <a:p>
-            <a:pPr lvl="1"/>
-            <a:r>
-              <a:rPr lang="en-IN" dirty="0" smtClean="0"/>
-              <a:t>It can be obtained from a specific source.</a:t>
-            </a:r>
-          </a:p>
-          <a:p>
-            <a:pPr lvl="1"/>
-            <a:r>
-              <a:rPr lang="en-IN" dirty="0" smtClean="0"/>
-              <a:t>It is processed by the program to obtain desired results.</a:t>
-            </a:r>
-            <a:endParaRPr lang="en-IN" dirty="0" smtClean="0"/>
-          </a:p>
-          <a:p>
-            <a:endParaRPr lang="en-IN" dirty="0" smtClean="0"/>
-          </a:p>
-        </p:txBody>
-      </p:sp>
-    </p:spTree>
-  </p:cSld>
-  <p:clrMapOvr>
-    <a:masterClrMapping/>
-  </p:clrMapOvr>
-</p:sld>
-</file>
-
 <file path=ppt/slides/slide3.xml><?xml version="1.0" encoding="utf-8"?>
 <p:sld xmlns:a="http://schemas.openxmlformats.org/drawingml/2006/main" xmlns:r="http://schemas.openxmlformats.org/officeDocument/2006/relationships" xmlns:p="http://schemas.openxmlformats.org/presentationml/2006/main">
   <p:cSld>
@@ -18986,11 +19612,7 @@
             </a:r>
             <a:r>
               <a:rPr lang="en-US" dirty="0" smtClean="0"/>
-              <a:t> of all classes representing an output stream of bytes</a:t>
-            </a:r>
-            <a:r>
-              <a:rPr lang="en-US" dirty="0" smtClean="0"/>
-              <a:t>.</a:t>
+              <a:t> of all classes representing an output stream of bytes.</a:t>
             </a:r>
           </a:p>
           <a:p>
@@ -19011,30 +19633,14 @@
             <a:pPr lvl="1"/>
             <a:r>
               <a:rPr lang="en-IN" dirty="0" smtClean="0"/>
-              <a:t>It helps to </a:t>
-            </a:r>
-            <a:r>
-              <a:rPr lang="en-IN" dirty="0" smtClean="0"/>
-              <a:t>read a </a:t>
-            </a:r>
-            <a:r>
-              <a:rPr lang="en-IN" dirty="0" smtClean="0"/>
-              <a:t>data to the </a:t>
-            </a:r>
-            <a:r>
-              <a:rPr lang="en-IN" dirty="0" smtClean="0"/>
-              <a:t>source.</a:t>
+              <a:t>It helps to read a data to the source.</a:t>
             </a:r>
           </a:p>
           <a:p>
             <a:pPr lvl="1"/>
             <a:r>
               <a:rPr lang="en-US" dirty="0" smtClean="0"/>
-              <a:t>It </a:t>
-            </a:r>
-            <a:r>
-              <a:rPr lang="en-US" dirty="0" smtClean="0"/>
-              <a:t>is the </a:t>
+              <a:t>It is the </a:t>
             </a:r>
             <a:r>
               <a:rPr lang="en-US" dirty="0" err="1" smtClean="0"/>

</xml_diff>

<commit_message>
Last Update 26-08-2018  8:23:18.36
</commit_message>
<xml_diff>
--- a/Slides/Unit 3/CS8392-U3-Input-and-Output.pptx
+++ b/Slides/Unit 3/CS8392-U3-Input-and-Output.pptx
@@ -5,7 +5,7 @@
     <p:sldMasterId id="2147483648" r:id="rId1"/>
   </p:sldMasterIdLst>
   <p:notesMasterIdLst>
-    <p:notesMasterId r:id="rId26"/>
+    <p:notesMasterId r:id="rId27"/>
   </p:notesMasterIdLst>
   <p:sldIdLst>
     <p:sldId id="256" r:id="rId2"/>
@@ -24,14 +24,15 @@
     <p:sldId id="285" r:id="rId15"/>
     <p:sldId id="286" r:id="rId16"/>
     <p:sldId id="287" r:id="rId17"/>
-    <p:sldId id="288" r:id="rId18"/>
-    <p:sldId id="289" r:id="rId19"/>
-    <p:sldId id="290" r:id="rId20"/>
-    <p:sldId id="291" r:id="rId21"/>
-    <p:sldId id="292" r:id="rId22"/>
-    <p:sldId id="293" r:id="rId23"/>
-    <p:sldId id="294" r:id="rId24"/>
-    <p:sldId id="272" r:id="rId25"/>
+    <p:sldId id="295" r:id="rId18"/>
+    <p:sldId id="296" r:id="rId19"/>
+    <p:sldId id="288" r:id="rId20"/>
+    <p:sldId id="290" r:id="rId21"/>
+    <p:sldId id="291" r:id="rId22"/>
+    <p:sldId id="292" r:id="rId23"/>
+    <p:sldId id="293" r:id="rId24"/>
+    <p:sldId id="294" r:id="rId25"/>
+    <p:sldId id="272" r:id="rId26"/>
   </p:sldIdLst>
   <p:sldSz cx="9144000" cy="6858000" type="screen4x3"/>
   <p:notesSz cx="6858000" cy="9144000"/>
@@ -13784,7 +13785,7 @@
             <a:fld id="{9515075B-F3F0-4441-A1BD-B7B515B708FF}" type="datetimeFigureOut">
               <a:rPr lang="en-US" smtClean="0"/>
               <a:pPr/>
-              <a:t>8/20/2018</a:t>
+              <a:t>8/21/2018</a:t>
             </a:fld>
             <a:endParaRPr lang="en-US"/>
           </a:p>
@@ -14321,7 +14322,7 @@
             <a:fld id="{6E658DF8-B8C0-4C7F-85EB-B53A2DDD44A9}" type="datetimeFigureOut">
               <a:rPr lang="en-US" smtClean="0"/>
               <a:pPr/>
-              <a:t>8/20/2018</a:t>
+              <a:t>8/21/2018</a:t>
             </a:fld>
             <a:endParaRPr lang="en-US"/>
           </a:p>
@@ -14488,7 +14489,7 @@
             <a:fld id="{6E658DF8-B8C0-4C7F-85EB-B53A2DDD44A9}" type="datetimeFigureOut">
               <a:rPr lang="en-US" smtClean="0"/>
               <a:pPr/>
-              <a:t>8/20/2018</a:t>
+              <a:t>8/21/2018</a:t>
             </a:fld>
             <a:endParaRPr lang="en-US"/>
           </a:p>
@@ -14665,7 +14666,7 @@
             <a:fld id="{6E658DF8-B8C0-4C7F-85EB-B53A2DDD44A9}" type="datetimeFigureOut">
               <a:rPr lang="en-US" smtClean="0"/>
               <a:pPr/>
-              <a:t>8/20/2018</a:t>
+              <a:t>8/21/2018</a:t>
             </a:fld>
             <a:endParaRPr lang="en-US"/>
           </a:p>
@@ -14864,7 +14865,7 @@
             <a:fld id="{6E658DF8-B8C0-4C7F-85EB-B53A2DDD44A9}" type="datetimeFigureOut">
               <a:rPr lang="en-US" smtClean="0"/>
               <a:pPr/>
-              <a:t>8/20/2018</a:t>
+              <a:t>8/21/2018</a:t>
             </a:fld>
             <a:endParaRPr lang="en-US"/>
           </a:p>
@@ -15107,7 +15108,7 @@
             <a:fld id="{6E658DF8-B8C0-4C7F-85EB-B53A2DDD44A9}" type="datetimeFigureOut">
               <a:rPr lang="en-US" smtClean="0"/>
               <a:pPr/>
-              <a:t>8/20/2018</a:t>
+              <a:t>8/21/2018</a:t>
             </a:fld>
             <a:endParaRPr lang="en-US"/>
           </a:p>
@@ -15392,7 +15393,7 @@
             <a:fld id="{6E658DF8-B8C0-4C7F-85EB-B53A2DDD44A9}" type="datetimeFigureOut">
               <a:rPr lang="en-US" smtClean="0"/>
               <a:pPr/>
-              <a:t>8/20/2018</a:t>
+              <a:t>8/21/2018</a:t>
             </a:fld>
             <a:endParaRPr lang="en-US"/>
           </a:p>
@@ -15811,7 +15812,7 @@
             <a:fld id="{6E658DF8-B8C0-4C7F-85EB-B53A2DDD44A9}" type="datetimeFigureOut">
               <a:rPr lang="en-US" smtClean="0"/>
               <a:pPr/>
-              <a:t>8/20/2018</a:t>
+              <a:t>8/21/2018</a:t>
             </a:fld>
             <a:endParaRPr lang="en-US"/>
           </a:p>
@@ -15926,7 +15927,7 @@
             <a:fld id="{6E658DF8-B8C0-4C7F-85EB-B53A2DDD44A9}" type="datetimeFigureOut">
               <a:rPr lang="en-US" smtClean="0"/>
               <a:pPr/>
-              <a:t>8/20/2018</a:t>
+              <a:t>8/21/2018</a:t>
             </a:fld>
             <a:endParaRPr lang="en-US"/>
           </a:p>
@@ -16018,7 +16019,7 @@
             <a:fld id="{6E658DF8-B8C0-4C7F-85EB-B53A2DDD44A9}" type="datetimeFigureOut">
               <a:rPr lang="en-US" smtClean="0"/>
               <a:pPr/>
-              <a:t>8/20/2018</a:t>
+              <a:t>8/21/2018</a:t>
             </a:fld>
             <a:endParaRPr lang="en-US"/>
           </a:p>
@@ -16292,7 +16293,7 @@
             <a:fld id="{6E658DF8-B8C0-4C7F-85EB-B53A2DDD44A9}" type="datetimeFigureOut">
               <a:rPr lang="en-US" smtClean="0"/>
               <a:pPr/>
-              <a:t>8/20/2018</a:t>
+              <a:t>8/21/2018</a:t>
             </a:fld>
             <a:endParaRPr lang="en-US"/>
           </a:p>
@@ -16542,7 +16543,7 @@
             <a:fld id="{6E658DF8-B8C0-4C7F-85EB-B53A2DDD44A9}" type="datetimeFigureOut">
               <a:rPr lang="en-US" smtClean="0"/>
               <a:pPr/>
-              <a:t>8/20/2018</a:t>
+              <a:t>8/21/2018</a:t>
             </a:fld>
             <a:endParaRPr lang="en-US"/>
           </a:p>
@@ -16758,7 +16759,7 @@
             <a:fld id="{6E658DF8-B8C0-4C7F-85EB-B53A2DDD44A9}" type="datetimeFigureOut">
               <a:rPr lang="en-US" smtClean="0"/>
               <a:pPr/>
-              <a:t>8/20/2018</a:t>
+              <a:t>8/21/2018</a:t>
             </a:fld>
             <a:endParaRPr lang="en-US"/>
           </a:p>
@@ -17995,45 +17996,54 @@
           <a:p>
             <a:r>
               <a:rPr lang="en-IN" dirty="0" smtClean="0"/>
-              <a:t>Using Console</a:t>
+              <a:t>Console Class for I/O</a:t>
             </a:r>
             <a:endParaRPr lang="en-US" dirty="0"/>
           </a:p>
         </p:txBody>
       </p:sp>
-      <p:pic>
-        <p:nvPicPr>
-          <p:cNvPr id="28675" name="Picture 3"/>
-          <p:cNvPicPr>
-            <a:picLocks noChangeAspect="1" noChangeArrowheads="1"/>
-          </p:cNvPicPr>
-          <p:nvPr/>
-        </p:nvPicPr>
-        <p:blipFill>
-          <a:blip r:embed="rId2"/>
-          <a:srcRect/>
-          <a:stretch>
-            <a:fillRect/>
-          </a:stretch>
-        </p:blipFill>
-        <p:spPr bwMode="auto">
-          <a:xfrm>
-            <a:off x="457200" y="1524000"/>
-            <a:ext cx="6781800" cy="3467100"/>
-          </a:xfrm>
-          <a:prstGeom prst="rect">
-            <a:avLst/>
-          </a:prstGeom>
-          <a:noFill/>
-          <a:ln w="9525">
-            <a:noFill/>
-            <a:miter lim="800000"/>
-            <a:headEnd/>
-            <a:tailEnd/>
-          </a:ln>
-          <a:effectLst/>
-        </p:spPr>
-      </p:pic>
+      <p:sp>
+        <p:nvSpPr>
+          <p:cNvPr id="3" name="Content Placeholder 2"/>
+          <p:cNvSpPr>
+            <a:spLocks noGrp="1"/>
+          </p:cNvSpPr>
+          <p:nvPr>
+            <p:ph idx="1"/>
+          </p:nvPr>
+        </p:nvSpPr>
+        <p:spPr/>
+        <p:txBody>
+          <a:bodyPr/>
+          <a:lstStyle/>
+          <a:p>
+            <a:r>
+              <a:rPr lang="en-US" dirty="0" smtClean="0"/>
+              <a:t>The </a:t>
+            </a:r>
+            <a:r>
+              <a:rPr lang="en-US" dirty="0" err="1" smtClean="0"/>
+              <a:t>Java.io.Console</a:t>
+            </a:r>
+            <a:r>
+              <a:rPr lang="en-US" dirty="0" smtClean="0"/>
+              <a:t> class provides methods to access the character-based console device, if any, associated with the current Java virtual machine. </a:t>
+            </a:r>
+            <a:endParaRPr lang="en-US" dirty="0" smtClean="0"/>
+          </a:p>
+          <a:p>
+            <a:r>
+              <a:rPr lang="en-US" dirty="0" smtClean="0"/>
+              <a:t>The </a:t>
+            </a:r>
+            <a:r>
+              <a:rPr lang="en-US" dirty="0" smtClean="0"/>
+              <a:t>Console class was added to java.io by JDK 6.</a:t>
+            </a:r>
+            <a:endParaRPr lang="en-US" dirty="0"/>
+          </a:p>
+        </p:txBody>
+      </p:sp>
     </p:spTree>
   </p:cSld>
   <p:clrMapOvr>
@@ -18076,45 +18086,105 @@
           <a:p>
             <a:r>
               <a:rPr lang="en-IN" dirty="0" smtClean="0"/>
-              <a:t>Output</a:t>
+              <a:t>Importance of Console</a:t>
             </a:r>
             <a:endParaRPr lang="en-US" dirty="0"/>
           </a:p>
         </p:txBody>
       </p:sp>
-      <p:pic>
-        <p:nvPicPr>
-          <p:cNvPr id="29698" name="Picture 2"/>
-          <p:cNvPicPr>
-            <a:picLocks noChangeAspect="1" noChangeArrowheads="1"/>
-          </p:cNvPicPr>
-          <p:nvPr/>
-        </p:nvPicPr>
-        <p:blipFill>
-          <a:blip r:embed="rId2"/>
-          <a:srcRect/>
-          <a:stretch>
-            <a:fillRect/>
-          </a:stretch>
-        </p:blipFill>
-        <p:spPr bwMode="auto">
-          <a:xfrm>
-            <a:off x="533400" y="1828800"/>
-            <a:ext cx="7436427" cy="2895600"/>
-          </a:xfrm>
-          <a:prstGeom prst="rect">
-            <a:avLst/>
-          </a:prstGeom>
-          <a:noFill/>
-          <a:ln w="9525">
-            <a:noFill/>
-            <a:miter lim="800000"/>
-            <a:headEnd/>
-            <a:tailEnd/>
-          </a:ln>
-          <a:effectLst/>
-        </p:spPr>
-      </p:pic>
+      <p:sp>
+        <p:nvSpPr>
+          <p:cNvPr id="3" name="Content Placeholder 2"/>
+          <p:cNvSpPr>
+            <a:spLocks noGrp="1"/>
+          </p:cNvSpPr>
+          <p:nvPr>
+            <p:ph idx="1"/>
+          </p:nvPr>
+        </p:nvSpPr>
+        <p:spPr/>
+        <p:txBody>
+          <a:bodyPr>
+            <a:normAutofit fontScale="85000" lnSpcReduction="20000"/>
+          </a:bodyPr>
+          <a:lstStyle/>
+          <a:p>
+            <a:pPr fontAlgn="base"/>
+            <a:r>
+              <a:rPr lang="en-US" dirty="0" smtClean="0"/>
+              <a:t>It is used to read from and write to the console, if one exists.</a:t>
+            </a:r>
+          </a:p>
+          <a:p>
+            <a:pPr fontAlgn="base"/>
+            <a:r>
+              <a:rPr lang="en-US" dirty="0" smtClean="0"/>
+              <a:t>Console is primarily a convenience class because most of its functionality is available through </a:t>
+            </a:r>
+            <a:r>
+              <a:rPr lang="en-US" dirty="0" err="1" smtClean="0"/>
+              <a:t>System.in</a:t>
+            </a:r>
+            <a:r>
+              <a:rPr lang="en-US" dirty="0" smtClean="0"/>
+              <a:t> and </a:t>
+            </a:r>
+            <a:r>
+              <a:rPr lang="en-US" dirty="0" err="1" smtClean="0"/>
+              <a:t>System.out</a:t>
+            </a:r>
+            <a:r>
+              <a:rPr lang="en-US" dirty="0" smtClean="0"/>
+              <a:t>.</a:t>
+            </a:r>
+          </a:p>
+          <a:p>
+            <a:r>
+              <a:rPr lang="en-US" dirty="0" smtClean="0"/>
+              <a:t>Console supplies no constructors. Instead, a Console object is obtained by calling </a:t>
+            </a:r>
+            <a:r>
+              <a:rPr lang="en-US" dirty="0" err="1" smtClean="0"/>
+              <a:t>System.console</a:t>
+            </a:r>
+            <a:r>
+              <a:rPr lang="en-US" dirty="0" smtClean="0"/>
+              <a:t>( </a:t>
+            </a:r>
+            <a:r>
+              <a:rPr lang="en-US" dirty="0" smtClean="0"/>
+              <a:t>).</a:t>
+            </a:r>
+          </a:p>
+          <a:p>
+            <a:r>
+              <a:rPr lang="en-US" dirty="0" smtClean="0"/>
+              <a:t>It provides methods to read text and password. If you read password using Console class, it will not be displayed to the user</a:t>
+            </a:r>
+            <a:r>
+              <a:rPr lang="en-US" dirty="0" smtClean="0"/>
+              <a:t>.</a:t>
+            </a:r>
+          </a:p>
+          <a:p>
+            <a:r>
+              <a:rPr lang="en-US" dirty="0" smtClean="0"/>
+              <a:t>The </a:t>
+            </a:r>
+            <a:r>
+              <a:rPr lang="en-US" dirty="0" err="1" smtClean="0"/>
+              <a:t>java.io.Console</a:t>
+            </a:r>
+            <a:r>
+              <a:rPr lang="en-US" dirty="0" smtClean="0"/>
+              <a:t> class is attached with system console internally.</a:t>
+            </a:r>
+          </a:p>
+          <a:p>
+            <a:endParaRPr lang="en-US" dirty="0"/>
+          </a:p>
+        </p:txBody>
+      </p:sp>
     </p:spTree>
   </p:cSld>
   <p:clrMapOvr>
@@ -18157,7 +18227,7 @@
           <a:p>
             <a:r>
               <a:rPr lang="en-IN" dirty="0" smtClean="0"/>
-              <a:t>Writing data to console</a:t>
+              <a:t>Using Console</a:t>
             </a:r>
             <a:endParaRPr lang="en-US" dirty="0"/>
           </a:p>
@@ -18165,7 +18235,7 @@
       </p:sp>
       <p:pic>
         <p:nvPicPr>
-          <p:cNvPr id="1026" name="Picture 2"/>
+          <p:cNvPr id="28675" name="Picture 3"/>
           <p:cNvPicPr>
             <a:picLocks noChangeAspect="1" noChangeArrowheads="1"/>
           </p:cNvPicPr>
@@ -18180,8 +18250,8 @@
         </p:blipFill>
         <p:spPr bwMode="auto">
           <a:xfrm>
-            <a:off x="609600" y="1752600"/>
-            <a:ext cx="5486400" cy="3858178"/>
+            <a:off x="457200" y="1524000"/>
+            <a:ext cx="6781800" cy="3467100"/>
           </a:xfrm>
           <a:prstGeom prst="rect">
             <a:avLst/>
@@ -18198,7 +18268,7 @@
       </p:pic>
       <p:pic>
         <p:nvPicPr>
-          <p:cNvPr id="1027" name="Picture 3"/>
+          <p:cNvPr id="4" name="Picture 2"/>
           <p:cNvPicPr>
             <a:picLocks noChangeAspect="1" noChangeArrowheads="1"/>
           </p:cNvPicPr>
@@ -18213,8 +18283,8 @@
         </p:blipFill>
         <p:spPr bwMode="auto">
           <a:xfrm>
-            <a:off x="3429000" y="4648200"/>
-            <a:ext cx="5114925" cy="1933575"/>
+            <a:off x="2743200" y="4191000"/>
+            <a:ext cx="6127174" cy="2385802"/>
           </a:xfrm>
           <a:prstGeom prst="rect">
             <a:avLst/>
@@ -18229,6 +18299,172 @@
           <a:effectLst/>
         </p:spPr>
       </p:pic>
+      <p:sp>
+        <p:nvSpPr>
+          <p:cNvPr id="5" name="Rectangle 4"/>
+          <p:cNvSpPr/>
+          <p:nvPr/>
+        </p:nvSpPr>
+        <p:spPr>
+          <a:xfrm>
+            <a:off x="5791200" y="1752600"/>
+            <a:ext cx="2057400" cy="381000"/>
+          </a:xfrm>
+          <a:prstGeom prst="rect">
+            <a:avLst/>
+          </a:prstGeom>
+        </p:spPr>
+        <p:style>
+          <a:lnRef idx="1">
+            <a:schemeClr val="accent3"/>
+          </a:lnRef>
+          <a:fillRef idx="2">
+            <a:schemeClr val="accent3"/>
+          </a:fillRef>
+          <a:effectRef idx="1">
+            <a:schemeClr val="accent3"/>
+          </a:effectRef>
+          <a:fontRef idx="minor">
+            <a:schemeClr val="dk1"/>
+          </a:fontRef>
+        </p:style>
+        <p:txBody>
+          <a:bodyPr rtlCol="0" anchor="ctr"/>
+          <a:lstStyle/>
+          <a:p>
+            <a:pPr algn="ctr"/>
+            <a:r>
+              <a:rPr lang="en-IN" sz="1500" b="1" dirty="0" smtClean="0">
+                <a:latin typeface="Times New Roman" pitchFamily="18" charset="0"/>
+                <a:cs typeface="Times New Roman" pitchFamily="18" charset="0"/>
+              </a:rPr>
+              <a:t>Console Class</a:t>
+            </a:r>
+            <a:endParaRPr lang="en-US" sz="1500" b="1" dirty="0">
+              <a:latin typeface="Times New Roman" pitchFamily="18" charset="0"/>
+              <a:cs typeface="Times New Roman" pitchFamily="18" charset="0"/>
+            </a:endParaRPr>
+          </a:p>
+        </p:txBody>
+      </p:sp>
+      <p:cxnSp>
+        <p:nvCxnSpPr>
+          <p:cNvPr id="7" name="Straight Arrow Connector 6"/>
+          <p:cNvCxnSpPr>
+            <a:stCxn id="5" idx="2"/>
+          </p:cNvCxnSpPr>
+          <p:nvPr/>
+        </p:nvCxnSpPr>
+        <p:spPr>
+          <a:xfrm rot="5400000">
+            <a:off x="6076950" y="2000250"/>
+            <a:ext cx="609600" cy="876300"/>
+          </a:xfrm>
+          <a:prstGeom prst="straightConnector1">
+            <a:avLst/>
+          </a:prstGeom>
+          <a:ln>
+            <a:tailEnd type="arrow"/>
+          </a:ln>
+        </p:spPr>
+        <p:style>
+          <a:lnRef idx="2">
+            <a:schemeClr val="dk1"/>
+          </a:lnRef>
+          <a:fillRef idx="0">
+            <a:schemeClr val="dk1"/>
+          </a:fillRef>
+          <a:effectRef idx="1">
+            <a:schemeClr val="dk1"/>
+          </a:effectRef>
+          <a:fontRef idx="minor">
+            <a:schemeClr val="tx1"/>
+          </a:fontRef>
+        </p:style>
+      </p:cxnSp>
+      <p:sp>
+        <p:nvSpPr>
+          <p:cNvPr id="8" name="Rectangle 7"/>
+          <p:cNvSpPr/>
+          <p:nvPr/>
+        </p:nvSpPr>
+        <p:spPr>
+          <a:xfrm>
+            <a:off x="6934200" y="2971800"/>
+            <a:ext cx="1600200" cy="304800"/>
+          </a:xfrm>
+          <a:prstGeom prst="rect">
+            <a:avLst/>
+          </a:prstGeom>
+        </p:spPr>
+        <p:style>
+          <a:lnRef idx="1">
+            <a:schemeClr val="accent3"/>
+          </a:lnRef>
+          <a:fillRef idx="2">
+            <a:schemeClr val="accent3"/>
+          </a:fillRef>
+          <a:effectRef idx="1">
+            <a:schemeClr val="accent3"/>
+          </a:effectRef>
+          <a:fontRef idx="minor">
+            <a:schemeClr val="dk1"/>
+          </a:fontRef>
+        </p:style>
+        <p:txBody>
+          <a:bodyPr rtlCol="0" anchor="ctr"/>
+          <a:lstStyle/>
+          <a:p>
+            <a:pPr algn="ctr"/>
+            <a:r>
+              <a:rPr lang="en-IN" sz="1500" b="1" dirty="0" smtClean="0">
+                <a:latin typeface="Times New Roman" pitchFamily="18" charset="0"/>
+                <a:cs typeface="Times New Roman" pitchFamily="18" charset="0"/>
+              </a:rPr>
+              <a:t>Read User Input</a:t>
+            </a:r>
+            <a:endParaRPr lang="en-US" sz="1500" b="1" dirty="0">
+              <a:latin typeface="Times New Roman" pitchFamily="18" charset="0"/>
+              <a:cs typeface="Times New Roman" pitchFamily="18" charset="0"/>
+            </a:endParaRPr>
+          </a:p>
+        </p:txBody>
+      </p:sp>
+      <p:cxnSp>
+        <p:nvCxnSpPr>
+          <p:cNvPr id="9" name="Straight Arrow Connector 8"/>
+          <p:cNvCxnSpPr>
+            <a:stCxn id="8" idx="1"/>
+          </p:cNvCxnSpPr>
+          <p:nvPr/>
+        </p:nvCxnSpPr>
+        <p:spPr>
+          <a:xfrm rot="10800000" flipV="1">
+            <a:off x="4800600" y="3124200"/>
+            <a:ext cx="2133600" cy="533400"/>
+          </a:xfrm>
+          <a:prstGeom prst="straightConnector1">
+            <a:avLst/>
+          </a:prstGeom>
+          <a:ln>
+            <a:tailEnd type="arrow"/>
+          </a:ln>
+        </p:spPr>
+        <p:style>
+          <a:lnRef idx="2">
+            <a:schemeClr val="dk1"/>
+          </a:lnRef>
+          <a:fillRef idx="0">
+            <a:schemeClr val="dk1"/>
+          </a:fillRef>
+          <a:effectRef idx="1">
+            <a:schemeClr val="dk1"/>
+          </a:effectRef>
+          <a:fontRef idx="minor">
+            <a:schemeClr val="tx1"/>
+          </a:fontRef>
+        </p:style>
+      </p:cxnSp>
     </p:spTree>
   </p:cSld>
   <p:clrMapOvr>
@@ -18387,6 +18623,299 @@
           <a:p>
             <a:r>
               <a:rPr lang="en-IN" dirty="0" smtClean="0"/>
+              <a:t>Writing data to console</a:t>
+            </a:r>
+            <a:endParaRPr lang="en-US" dirty="0"/>
+          </a:p>
+        </p:txBody>
+      </p:sp>
+      <p:grpSp>
+        <p:nvGrpSpPr>
+          <p:cNvPr id="13" name="Group 12"/>
+          <p:cNvGrpSpPr/>
+          <p:nvPr/>
+        </p:nvGrpSpPr>
+        <p:grpSpPr>
+          <a:xfrm>
+            <a:off x="609600" y="1752600"/>
+            <a:ext cx="7934325" cy="4829175"/>
+            <a:chOff x="609600" y="1752600"/>
+            <a:chExt cx="7934325" cy="4829175"/>
+          </a:xfrm>
+        </p:grpSpPr>
+        <p:pic>
+          <p:nvPicPr>
+            <p:cNvPr id="1026" name="Picture 2"/>
+            <p:cNvPicPr>
+              <a:picLocks noChangeAspect="1" noChangeArrowheads="1"/>
+            </p:cNvPicPr>
+            <p:nvPr/>
+          </p:nvPicPr>
+          <p:blipFill>
+            <a:blip r:embed="rId2"/>
+            <a:srcRect/>
+            <a:stretch>
+              <a:fillRect/>
+            </a:stretch>
+          </p:blipFill>
+          <p:spPr bwMode="auto">
+            <a:xfrm>
+              <a:off x="609600" y="1752600"/>
+              <a:ext cx="5486400" cy="3858178"/>
+            </a:xfrm>
+            <a:prstGeom prst="rect">
+              <a:avLst/>
+            </a:prstGeom>
+            <a:noFill/>
+            <a:ln w="9525">
+              <a:noFill/>
+              <a:miter lim="800000"/>
+              <a:headEnd/>
+              <a:tailEnd/>
+            </a:ln>
+            <a:effectLst/>
+          </p:spPr>
+        </p:pic>
+        <p:pic>
+          <p:nvPicPr>
+            <p:cNvPr id="1027" name="Picture 3"/>
+            <p:cNvPicPr>
+              <a:picLocks noChangeAspect="1" noChangeArrowheads="1"/>
+            </p:cNvPicPr>
+            <p:nvPr/>
+          </p:nvPicPr>
+          <p:blipFill>
+            <a:blip r:embed="rId3"/>
+            <a:srcRect/>
+            <a:stretch>
+              <a:fillRect/>
+            </a:stretch>
+          </p:blipFill>
+          <p:spPr bwMode="auto">
+            <a:xfrm>
+              <a:off x="2824280" y="4419600"/>
+              <a:ext cx="5719645" cy="2162175"/>
+            </a:xfrm>
+            <a:prstGeom prst="rect">
+              <a:avLst/>
+            </a:prstGeom>
+            <a:noFill/>
+            <a:ln w="9525">
+              <a:noFill/>
+              <a:miter lim="800000"/>
+              <a:headEnd/>
+              <a:tailEnd/>
+            </a:ln>
+            <a:effectLst/>
+          </p:spPr>
+        </p:pic>
+        <p:sp>
+          <p:nvSpPr>
+            <p:cNvPr id="5" name="Rectangle 4"/>
+            <p:cNvSpPr/>
+            <p:nvPr/>
+          </p:nvSpPr>
+          <p:spPr>
+            <a:xfrm>
+              <a:off x="6934200" y="2971800"/>
+              <a:ext cx="1600200" cy="304800"/>
+            </a:xfrm>
+            <a:prstGeom prst="rect">
+              <a:avLst/>
+            </a:prstGeom>
+          </p:spPr>
+          <p:style>
+            <a:lnRef idx="1">
+              <a:schemeClr val="accent3"/>
+            </a:lnRef>
+            <a:fillRef idx="2">
+              <a:schemeClr val="accent3"/>
+            </a:fillRef>
+            <a:effectRef idx="1">
+              <a:schemeClr val="accent3"/>
+            </a:effectRef>
+            <a:fontRef idx="minor">
+              <a:schemeClr val="dk1"/>
+            </a:fontRef>
+          </p:style>
+          <p:txBody>
+            <a:bodyPr rtlCol="0" anchor="ctr"/>
+            <a:lstStyle/>
+            <a:p>
+              <a:pPr algn="ctr"/>
+              <a:r>
+                <a:rPr lang="en-IN" sz="1500" b="1" dirty="0" smtClean="0">
+                  <a:latin typeface="Times New Roman" pitchFamily="18" charset="0"/>
+                  <a:cs typeface="Times New Roman" pitchFamily="18" charset="0"/>
+                </a:rPr>
+                <a:t>Getting Writer</a:t>
+              </a:r>
+              <a:endParaRPr lang="en-US" sz="1500" b="1" dirty="0">
+                <a:latin typeface="Times New Roman" pitchFamily="18" charset="0"/>
+                <a:cs typeface="Times New Roman" pitchFamily="18" charset="0"/>
+              </a:endParaRPr>
+            </a:p>
+          </p:txBody>
+        </p:sp>
+        <p:cxnSp>
+          <p:nvCxnSpPr>
+            <p:cNvPr id="6" name="Straight Arrow Connector 5"/>
+            <p:cNvCxnSpPr/>
+            <p:nvPr/>
+          </p:nvCxnSpPr>
+          <p:spPr>
+            <a:xfrm rot="10800000">
+              <a:off x="4648200" y="3124200"/>
+              <a:ext cx="2286000" cy="1588"/>
+            </a:xfrm>
+            <a:prstGeom prst="straightConnector1">
+              <a:avLst/>
+            </a:prstGeom>
+            <a:ln>
+              <a:tailEnd type="arrow"/>
+            </a:ln>
+          </p:spPr>
+          <p:style>
+            <a:lnRef idx="2">
+              <a:schemeClr val="dk1"/>
+            </a:lnRef>
+            <a:fillRef idx="0">
+              <a:schemeClr val="dk1"/>
+            </a:fillRef>
+            <a:effectRef idx="1">
+              <a:schemeClr val="dk1"/>
+            </a:effectRef>
+            <a:fontRef idx="minor">
+              <a:schemeClr val="tx1"/>
+            </a:fontRef>
+          </p:style>
+        </p:cxnSp>
+        <p:sp>
+          <p:nvSpPr>
+            <p:cNvPr id="8" name="Rectangle 7"/>
+            <p:cNvSpPr/>
+            <p:nvPr/>
+          </p:nvSpPr>
+          <p:spPr>
+            <a:xfrm>
+              <a:off x="6858000" y="4038600"/>
+              <a:ext cx="1600200" cy="304800"/>
+            </a:xfrm>
+            <a:prstGeom prst="rect">
+              <a:avLst/>
+            </a:prstGeom>
+          </p:spPr>
+          <p:style>
+            <a:lnRef idx="1">
+              <a:schemeClr val="accent3"/>
+            </a:lnRef>
+            <a:fillRef idx="2">
+              <a:schemeClr val="accent3"/>
+            </a:fillRef>
+            <a:effectRef idx="1">
+              <a:schemeClr val="accent3"/>
+            </a:effectRef>
+            <a:fontRef idx="minor">
+              <a:schemeClr val="dk1"/>
+            </a:fontRef>
+          </p:style>
+          <p:txBody>
+            <a:bodyPr rtlCol="0" anchor="ctr"/>
+            <a:lstStyle/>
+            <a:p>
+              <a:pPr algn="ctr"/>
+              <a:r>
+                <a:rPr lang="en-IN" sz="1500" b="1" dirty="0" smtClean="0">
+                  <a:latin typeface="Times New Roman" pitchFamily="18" charset="0"/>
+                  <a:cs typeface="Times New Roman" pitchFamily="18" charset="0"/>
+                </a:rPr>
+                <a:t>Writing data</a:t>
+              </a:r>
+              <a:endParaRPr lang="en-US" sz="1500" b="1" dirty="0">
+                <a:latin typeface="Times New Roman" pitchFamily="18" charset="0"/>
+                <a:cs typeface="Times New Roman" pitchFamily="18" charset="0"/>
+              </a:endParaRPr>
+            </a:p>
+          </p:txBody>
+        </p:sp>
+        <p:cxnSp>
+          <p:nvCxnSpPr>
+            <p:cNvPr id="9" name="Straight Arrow Connector 8"/>
+            <p:cNvCxnSpPr>
+              <a:stCxn id="8" idx="1"/>
+            </p:cNvCxnSpPr>
+            <p:nvPr/>
+          </p:nvCxnSpPr>
+          <p:spPr>
+            <a:xfrm rot="10800000">
+              <a:off x="3733800" y="4191000"/>
+              <a:ext cx="3124200" cy="1588"/>
+            </a:xfrm>
+            <a:prstGeom prst="straightConnector1">
+              <a:avLst/>
+            </a:prstGeom>
+            <a:ln>
+              <a:tailEnd type="arrow"/>
+            </a:ln>
+          </p:spPr>
+          <p:style>
+            <a:lnRef idx="2">
+              <a:schemeClr val="dk1"/>
+            </a:lnRef>
+            <a:fillRef idx="0">
+              <a:schemeClr val="dk1"/>
+            </a:fillRef>
+            <a:effectRef idx="1">
+              <a:schemeClr val="dk1"/>
+            </a:effectRef>
+            <a:fontRef idx="minor">
+              <a:schemeClr val="tx1"/>
+            </a:fontRef>
+          </p:style>
+        </p:cxnSp>
+      </p:grpSp>
+    </p:spTree>
+  </p:cSld>
+  <p:clrMapOvr>
+    <a:masterClrMapping/>
+  </p:clrMapOvr>
+</p:sld>
+</file>
+
+<file path=ppt/slides/slide21.xml><?xml version="1.0" encoding="utf-8"?>
+<p:sld xmlns:a="http://schemas.openxmlformats.org/drawingml/2006/main" xmlns:r="http://schemas.openxmlformats.org/officeDocument/2006/relationships" xmlns:p="http://schemas.openxmlformats.org/presentationml/2006/main">
+  <p:cSld>
+    <p:spTree>
+      <p:nvGrpSpPr>
+        <p:cNvPr id="1" name=""/>
+        <p:cNvGrpSpPr/>
+        <p:nvPr/>
+      </p:nvGrpSpPr>
+      <p:grpSpPr>
+        <a:xfrm>
+          <a:off x="0" y="0"/>
+          <a:ext cx="0" cy="0"/>
+          <a:chOff x="0" y="0"/>
+          <a:chExt cx="0" cy="0"/>
+        </a:xfrm>
+      </p:grpSpPr>
+      <p:sp>
+        <p:nvSpPr>
+          <p:cNvPr id="2" name="Title 1"/>
+          <p:cNvSpPr>
+            <a:spLocks noGrp="1"/>
+          </p:cNvSpPr>
+          <p:nvPr>
+            <p:ph type="title"/>
+          </p:nvPr>
+        </p:nvSpPr>
+        <p:spPr/>
+        <p:txBody>
+          <a:bodyPr/>
+          <a:lstStyle/>
+          <a:p>
+            <a:r>
+              <a:rPr lang="en-IN" dirty="0" smtClean="0"/>
               <a:t>Reading Passwords</a:t>
             </a:r>
             <a:endParaRPr lang="en-US" dirty="0"/>
@@ -18434,7 +18963,7 @@
 </p:sld>
 </file>
 
-<file path=ppt/slides/slide21.xml><?xml version="1.0" encoding="utf-8"?>
+<file path=ppt/slides/slide22.xml><?xml version="1.0" encoding="utf-8"?>
 <p:sld xmlns:a="http://schemas.openxmlformats.org/drawingml/2006/main" xmlns:r="http://schemas.openxmlformats.org/officeDocument/2006/relationships" xmlns:p="http://schemas.openxmlformats.org/presentationml/2006/main">
   <p:cSld>
     <p:spTree>
@@ -18515,7 +19044,7 @@
 </p:sld>
 </file>
 
-<file path=ppt/slides/slide22.xml><?xml version="1.0" encoding="utf-8"?>
+<file path=ppt/slides/slide23.xml><?xml version="1.0" encoding="utf-8"?>
 <p:sld xmlns:a="http://schemas.openxmlformats.org/drawingml/2006/main" xmlns:r="http://schemas.openxmlformats.org/officeDocument/2006/relationships" xmlns:p="http://schemas.openxmlformats.org/presentationml/2006/main">
   <p:cSld>
     <p:spTree>
@@ -18545,7 +19074,7 @@
         <p:spPr>
           <a:xfrm>
             <a:off x="457200" y="274638"/>
-            <a:ext cx="4724400" cy="563562"/>
+            <a:ext cx="3962400" cy="563562"/>
           </a:xfrm>
         </p:spPr>
         <p:txBody>
@@ -18556,15 +19085,7 @@
           <a:p>
             <a:r>
               <a:rPr lang="en-IN" sz="2500" dirty="0" smtClean="0"/>
-              <a:t>Reading data from </a:t>
-            </a:r>
-            <a:r>
-              <a:rPr lang="en-IN" sz="2500" dirty="0" smtClean="0"/>
-              <a:t>f</a:t>
-            </a:r>
-            <a:r>
-              <a:rPr lang="en-IN" sz="2500" dirty="0" smtClean="0"/>
-              <a:t>ile</a:t>
+              <a:t>Reading data from file</a:t>
             </a:r>
             <a:endParaRPr lang="en-US" sz="2500" dirty="0"/>
           </a:p>
@@ -18677,7 +19198,7 @@
 </p:sld>
 </file>
 
-<file path=ppt/slides/slide23.xml><?xml version="1.0" encoding="utf-8"?>
+<file path=ppt/slides/slide24.xml><?xml version="1.0" encoding="utf-8"?>
 <p:sld xmlns:a="http://schemas.openxmlformats.org/drawingml/2006/main" xmlns:r="http://schemas.openxmlformats.org/officeDocument/2006/relationships" xmlns:p="http://schemas.openxmlformats.org/presentationml/2006/main">
   <p:cSld>
     <p:spTree>
@@ -18718,15 +19239,7 @@
           <a:p>
             <a:r>
               <a:rPr lang="en-IN" sz="2500" dirty="0" smtClean="0"/>
-              <a:t>Writing data to </a:t>
-            </a:r>
-            <a:r>
-              <a:rPr lang="en-IN" sz="2500" dirty="0" smtClean="0"/>
-              <a:t>f</a:t>
-            </a:r>
-            <a:r>
-              <a:rPr lang="en-IN" sz="2500" dirty="0" smtClean="0"/>
-              <a:t>ile</a:t>
+              <a:t>Writing data to file</a:t>
             </a:r>
             <a:endParaRPr lang="en-US" sz="2500" dirty="0"/>
           </a:p>
@@ -18905,7 +19418,7 @@
 </p:sld>
 </file>
 
-<file path=ppt/slides/slide24.xml><?xml version="1.0" encoding="utf-8"?>
+<file path=ppt/slides/slide25.xml><?xml version="1.0" encoding="utf-8"?>
 <p:sld xmlns:a="http://schemas.openxmlformats.org/drawingml/2006/main" xmlns:r="http://schemas.openxmlformats.org/officeDocument/2006/relationships" xmlns:p="http://schemas.openxmlformats.org/presentationml/2006/main">
   <p:cSld>
     <p:spTree>

</xml_diff>